<commit_message>
14.04 Leverage Graphs added
</commit_message>
<xml_diff>
--- a/Präsentation/US Commercial Banks.pptx
+++ b/Präsentation/US Commercial Banks.pptx
@@ -115,6 +115,11 @@
       </a:defRPr>
     </a:lvl9pPr>
   </p:defaultTextStyle>
+  <p:extLst>
+    <p:ext uri="{EFAFB233-063F-42B5-8137-9DF3F51BA10A}">
+      <p15:sldGuideLst xmlns:p15="http://schemas.microsoft.com/office/powerpoint/2012/main"/>
+    </p:ext>
+  </p:extLst>
 </p:presentation>
 </file>
 
@@ -304,7 +309,7 @@
           <a:p>
             <a:fld id="{4AAD347D-5ACD-4C99-B74B-A9C85AD731AF}" type="datetimeFigureOut">
               <a:rPr lang="en-US" dirty="0"/>
-              <a:t>4/9/2020</a:t>
+              <a:t>4/10/2020</a:t>
             </a:fld>
             <a:endParaRPr lang="en-US" dirty="0"/>
           </a:p>
@@ -574,7 +579,7 @@
           <a:p>
             <a:fld id="{4509A250-FF31-4206-8172-F9D3106AACB1}" type="datetimeFigureOut">
               <a:rPr lang="en-US" dirty="0"/>
-              <a:t>4/9/2020</a:t>
+              <a:t>4/10/2020</a:t>
             </a:fld>
             <a:endParaRPr lang="en-US" dirty="0"/>
           </a:p>
@@ -763,7 +768,7 @@
           <a:p>
             <a:fld id="{4509A250-FF31-4206-8172-F9D3106AACB1}" type="datetimeFigureOut">
               <a:rPr lang="en-US" dirty="0"/>
-              <a:t>4/9/2020</a:t>
+              <a:t>4/10/2020</a:t>
             </a:fld>
             <a:endParaRPr lang="en-US" dirty="0"/>
           </a:p>
@@ -1031,7 +1036,7 @@
           <a:p>
             <a:fld id="{4509A250-FF31-4206-8172-F9D3106AACB1}" type="datetimeFigureOut">
               <a:rPr lang="en-US" dirty="0"/>
-              <a:t>4/9/2020</a:t>
+              <a:t>4/10/2020</a:t>
             </a:fld>
             <a:endParaRPr lang="en-US" dirty="0"/>
           </a:p>
@@ -1367,7 +1372,7 @@
           <a:p>
             <a:fld id="{4509A250-FF31-4206-8172-F9D3106AACB1}" type="datetimeFigureOut">
               <a:rPr lang="en-US" dirty="0"/>
-              <a:t>4/9/2020</a:t>
+              <a:t>4/10/2020</a:t>
             </a:fld>
             <a:endParaRPr lang="en-US" dirty="0"/>
           </a:p>
@@ -1985,7 +1990,7 @@
           <a:p>
             <a:fld id="{4509A250-FF31-4206-8172-F9D3106AACB1}" type="datetimeFigureOut">
               <a:rPr lang="en-US" dirty="0"/>
-              <a:t>4/9/2020</a:t>
+              <a:t>4/10/2020</a:t>
             </a:fld>
             <a:endParaRPr lang="en-US" dirty="0"/>
           </a:p>
@@ -2840,7 +2845,7 @@
           <a:p>
             <a:fld id="{4509A250-FF31-4206-8172-F9D3106AACB1}" type="datetimeFigureOut">
               <a:rPr lang="en-US" dirty="0"/>
-              <a:t>4/9/2020</a:t>
+              <a:t>4/10/2020</a:t>
             </a:fld>
             <a:endParaRPr lang="en-US" dirty="0"/>
           </a:p>
@@ -3005,7 +3010,7 @@
           <a:p>
             <a:fld id="{4509A250-FF31-4206-8172-F9D3106AACB1}" type="datetimeFigureOut">
               <a:rPr lang="en-US" dirty="0"/>
-              <a:t>4/9/2020</a:t>
+              <a:t>4/10/2020</a:t>
             </a:fld>
             <a:endParaRPr lang="en-US" dirty="0"/>
           </a:p>
@@ -3180,7 +3185,7 @@
           <a:p>
             <a:fld id="{4509A250-FF31-4206-8172-F9D3106AACB1}" type="datetimeFigureOut">
               <a:rPr lang="en-US" dirty="0"/>
-              <a:t>4/9/2020</a:t>
+              <a:t>4/10/2020</a:t>
             </a:fld>
             <a:endParaRPr lang="en-US" dirty="0"/>
           </a:p>
@@ -3345,7 +3350,7 @@
           <a:p>
             <a:fld id="{4509A250-FF31-4206-8172-F9D3106AACB1}" type="datetimeFigureOut">
               <a:rPr lang="en-US" dirty="0"/>
-              <a:t>4/9/2020</a:t>
+              <a:t>4/10/2020</a:t>
             </a:fld>
             <a:endParaRPr lang="en-US" dirty="0"/>
           </a:p>
@@ -3587,7 +3592,7 @@
           <a:p>
             <a:fld id="{9796027F-7875-4030-9381-8BD8C4F21935}" type="datetimeFigureOut">
               <a:rPr lang="en-US" dirty="0"/>
-              <a:t>4/9/2020</a:t>
+              <a:t>4/10/2020</a:t>
             </a:fld>
             <a:endParaRPr lang="en-US" dirty="0"/>
           </a:p>
@@ -3874,7 +3879,7 @@
           <a:p>
             <a:fld id="{9796027F-7875-4030-9381-8BD8C4F21935}" type="datetimeFigureOut">
               <a:rPr lang="en-US" dirty="0"/>
-              <a:t>4/9/2020</a:t>
+              <a:t>4/10/2020</a:t>
             </a:fld>
             <a:endParaRPr lang="en-US" dirty="0"/>
           </a:p>
@@ -4313,7 +4318,7 @@
           <a:p>
             <a:fld id="{9796027F-7875-4030-9381-8BD8C4F21935}" type="datetimeFigureOut">
               <a:rPr lang="en-US" dirty="0"/>
-              <a:t>4/9/2020</a:t>
+              <a:t>4/10/2020</a:t>
             </a:fld>
             <a:endParaRPr lang="en-US" dirty="0"/>
           </a:p>
@@ -4426,7 +4431,7 @@
           <a:p>
             <a:fld id="{4509A250-FF31-4206-8172-F9D3106AACB1}" type="datetimeFigureOut">
               <a:rPr lang="en-US" dirty="0"/>
-              <a:t>4/9/2020</a:t>
+              <a:t>4/10/2020</a:t>
             </a:fld>
             <a:endParaRPr lang="en-US" dirty="0"/>
           </a:p>
@@ -4516,7 +4521,7 @@
           <a:p>
             <a:fld id="{4509A250-FF31-4206-8172-F9D3106AACB1}" type="datetimeFigureOut">
               <a:rPr lang="en-US" dirty="0"/>
-              <a:t>4/9/2020</a:t>
+              <a:t>4/10/2020</a:t>
             </a:fld>
             <a:endParaRPr lang="en-US" dirty="0"/>
           </a:p>
@@ -4790,7 +4795,7 @@
           <a:p>
             <a:fld id="{4509A250-FF31-4206-8172-F9D3106AACB1}" type="datetimeFigureOut">
               <a:rPr lang="en-US" dirty="0"/>
-              <a:t>4/9/2020</a:t>
+              <a:t>4/10/2020</a:t>
             </a:fld>
             <a:endParaRPr lang="en-US" dirty="0"/>
           </a:p>
@@ -5060,7 +5065,7 @@
           <a:p>
             <a:fld id="{4509A250-FF31-4206-8172-F9D3106AACB1}" type="datetimeFigureOut">
               <a:rPr lang="en-US" dirty="0"/>
-              <a:t>4/9/2020</a:t>
+              <a:t>4/10/2020</a:t>
             </a:fld>
             <a:endParaRPr lang="en-US" dirty="0"/>
           </a:p>
@@ -5484,7 +5489,7 @@
           <a:p>
             <a:fld id="{4AAD347D-5ACD-4C99-B74B-A9C85AD731AF}" type="datetimeFigureOut">
               <a:rPr lang="en-US" dirty="0"/>
-              <a:t>4/9/2020</a:t>
+              <a:t>4/10/2020</a:t>
             </a:fld>
             <a:endParaRPr lang="en-US" dirty="0"/>
           </a:p>
@@ -6179,9 +6184,16 @@
           <a:p>
             <a:r>
               <a:rPr lang="en-US" dirty="0"/>
-              <a:t>An interesting observation can be found for the correlation between category 1 and category 2 (lag 1) one period later. The correlation did rise from 0.4 to 0.43 with an one quarter lag. </a:t>
-            </a:r>
-            <a:endParaRPr lang="en-US" dirty="0"/>
+              <a:t>An interesting observation can be found for the correlation between category 1 and category 2 (lag 1) one period later. The correlation did rise from </a:t>
+            </a:r>
+            <a:r>
+              <a:rPr lang="en-US" dirty="0" smtClean="0"/>
+              <a:t>0.41 </a:t>
+            </a:r>
+            <a:r>
+              <a:rPr lang="en-US" dirty="0"/>
+              <a:t>to 0.43 with an one quarter lag. </a:t>
+            </a:r>
           </a:p>
           <a:p>
             <a:r>
@@ -6364,12 +6376,8 @@
               <a:t>~</a:t>
             </a:r>
             <a:r>
-              <a:rPr lang="en-US" dirty="0"/>
-              <a:t>60\%-80</a:t>
-            </a:r>
-            <a:r>
               <a:rPr lang="en-US" dirty="0" smtClean="0"/>
-              <a:t>\% </a:t>
+              <a:t>60%-80% </a:t>
             </a:r>
             <a:r>
               <a:rPr lang="en-US" dirty="0"/>
@@ -6380,12 +6388,8 @@
               <a:t>~</a:t>
             </a:r>
             <a:r>
-              <a:rPr lang="en-US" dirty="0"/>
-              <a:t>60</a:t>
-            </a:r>
-            <a:r>
               <a:rPr lang="en-US" dirty="0" smtClean="0"/>
-              <a:t>\% </a:t>
+              <a:t>60% </a:t>
             </a:r>
             <a:r>
               <a:rPr lang="en-US" dirty="0"/>
@@ -7534,7 +7538,6 @@
               <a:rPr lang="en-US" dirty="0"/>
               <a:t> and trading assets. </a:t>
             </a:r>
-            <a:endParaRPr lang="en-US" dirty="0"/>
           </a:p>
           <a:p>
             <a:pPr lvl="2"/>
@@ -7590,12 +7593,20 @@
               <a:t>: </a:t>
             </a:r>
             <a:r>
-              <a:rPr lang="en-US" dirty="0" err="1" smtClean="0"/>
-              <a:t>Canoncial</a:t>
-            </a:r>
-            <a:r>
               <a:rPr lang="en-US" dirty="0" smtClean="0"/>
-              <a:t> correlation analysis, Modigliani-Miller-Theorem, Correlation not equals Causation.</a:t>
+              <a:t>Canonical </a:t>
+            </a:r>
+            <a:r>
+              <a:rPr lang="en-US" dirty="0" smtClean="0"/>
+              <a:t>correlation analysis</a:t>
+            </a:r>
+            <a:r>
+              <a:rPr lang="en-US" u="sng" dirty="0" smtClean="0"/>
+              <a:t>, Modigliani-Miller-Theorem</a:t>
+            </a:r>
+            <a:r>
+              <a:rPr lang="en-US" dirty="0" smtClean="0"/>
+              <a:t>, Correlation not equals Causation.</a:t>
             </a:r>
           </a:p>
           <a:p>
@@ -7952,11 +7963,15 @@
           <a:p>
             <a:r>
               <a:rPr lang="de-DE" dirty="0" err="1" smtClean="0"/>
-              <a:t>To</a:t>
-            </a:r>
-            <a:r>
-              <a:rPr lang="de-DE" dirty="0" smtClean="0"/>
-              <a:t> Big </a:t>
+              <a:t>Too</a:t>
+            </a:r>
+            <a:r>
+              <a:rPr lang="de-DE" dirty="0" smtClean="0"/>
+              <a:t> </a:t>
+            </a:r>
+            <a:r>
+              <a:rPr lang="de-DE" dirty="0" smtClean="0"/>
+              <a:t>Big </a:t>
             </a:r>
             <a:r>
               <a:rPr lang="de-DE" dirty="0" err="1" smtClean="0"/>

</xml_diff>